<commit_message>
money, start date, end date boxes moved to above the graph
</commit_message>
<xml_diff>
--- a/docs/design/UIprototype.pptx
+++ b/docs/design/UIprototype.pptx
@@ -129,66 +129,7 @@
     </mc:Fallback>
   </mc:AlternateContent>
   <c:chart>
-    <c:title>
-      <c:tx>
-        <c:rich>
-          <a:bodyPr rot="0" spcFirstLastPara="1" vertOverflow="ellipsis" vert="horz" wrap="square" anchor="ctr" anchorCtr="1"/>
-          <a:lstStyle/>
-          <a:p>
-            <a:pPr>
-              <a:defRPr sz="1862" b="0" i="0" u="none" strike="noStrike" kern="1200" spc="0" baseline="0">
-                <a:solidFill>
-                  <a:schemeClr val="tx1">
-                    <a:lumMod val="65000"/>
-                    <a:lumOff val="35000"/>
-                  </a:schemeClr>
-                </a:solidFill>
-                <a:latin typeface="+mn-lt"/>
-                <a:ea typeface="+mn-ea"/>
-                <a:cs typeface="+mn-cs"/>
-              </a:defRPr>
-            </a:pPr>
-            <a:r>
-              <a:rPr lang="en-US" sz="2000" dirty="0"/>
-              <a:t>Your</a:t>
-            </a:r>
-            <a:r>
-              <a:rPr lang="en-US" sz="2000" baseline="0" dirty="0"/>
-              <a:t> Stock Performance</a:t>
-            </a:r>
-          </a:p>
-        </c:rich>
-      </c:tx>
-      <c:overlay val="0"/>
-      <c:spPr>
-        <a:noFill/>
-        <a:ln>
-          <a:noFill/>
-        </a:ln>
-        <a:effectLst/>
-      </c:spPr>
-      <c:txPr>
-        <a:bodyPr rot="0" spcFirstLastPara="1" vertOverflow="ellipsis" vert="horz" wrap="square" anchor="ctr" anchorCtr="1"/>
-        <a:lstStyle/>
-        <a:p>
-          <a:pPr>
-            <a:defRPr sz="1862" b="0" i="0" u="none" strike="noStrike" kern="1200" spc="0" baseline="0">
-              <a:solidFill>
-                <a:schemeClr val="tx1">
-                  <a:lumMod val="65000"/>
-                  <a:lumOff val="35000"/>
-                </a:schemeClr>
-              </a:solidFill>
-              <a:latin typeface="+mn-lt"/>
-              <a:ea typeface="+mn-ea"/>
-              <a:cs typeface="+mn-cs"/>
-            </a:defRPr>
-          </a:pPr>
-          <a:endParaRPr lang="en-US"/>
-        </a:p>
-      </c:txPr>
-    </c:title>
-    <c:autoTitleDeleted val="0"/>
+    <c:autoTitleDeleted val="1"/>
     <c:plotArea>
       <c:layout/>
       <c:lineChart>
@@ -2266,7 +2207,7 @@
           <a:p>
             <a:fld id="{7814C785-670F-4FD8-BE2A-83BE1140FC41}" type="datetimeFigureOut">
               <a:rPr lang="en-US" smtClean="0"/>
-              <a:t>1/31/2018</a:t>
+              <a:t>2/15/2018</a:t>
             </a:fld>
             <a:endParaRPr lang="en-US"/>
           </a:p>
@@ -2434,7 +2375,7 @@
           <a:p>
             <a:fld id="{7814C785-670F-4FD8-BE2A-83BE1140FC41}" type="datetimeFigureOut">
               <a:rPr lang="en-US" smtClean="0"/>
-              <a:t>1/31/2018</a:t>
+              <a:t>2/15/2018</a:t>
             </a:fld>
             <a:endParaRPr lang="en-US"/>
           </a:p>
@@ -2612,7 +2553,7 @@
           <a:p>
             <a:fld id="{7814C785-670F-4FD8-BE2A-83BE1140FC41}" type="datetimeFigureOut">
               <a:rPr lang="en-US" smtClean="0"/>
-              <a:t>1/31/2018</a:t>
+              <a:t>2/15/2018</a:t>
             </a:fld>
             <a:endParaRPr lang="en-US"/>
           </a:p>
@@ -2780,7 +2721,7 @@
           <a:p>
             <a:fld id="{7814C785-670F-4FD8-BE2A-83BE1140FC41}" type="datetimeFigureOut">
               <a:rPr lang="en-US" smtClean="0"/>
-              <a:t>1/31/2018</a:t>
+              <a:t>2/15/2018</a:t>
             </a:fld>
             <a:endParaRPr lang="en-US"/>
           </a:p>
@@ -3025,7 +2966,7 @@
           <a:p>
             <a:fld id="{7814C785-670F-4FD8-BE2A-83BE1140FC41}" type="datetimeFigureOut">
               <a:rPr lang="en-US" smtClean="0"/>
-              <a:t>1/31/2018</a:t>
+              <a:t>2/15/2018</a:t>
             </a:fld>
             <a:endParaRPr lang="en-US"/>
           </a:p>
@@ -3254,7 +3195,7 @@
           <a:p>
             <a:fld id="{7814C785-670F-4FD8-BE2A-83BE1140FC41}" type="datetimeFigureOut">
               <a:rPr lang="en-US" smtClean="0"/>
-              <a:t>1/31/2018</a:t>
+              <a:t>2/15/2018</a:t>
             </a:fld>
             <a:endParaRPr lang="en-US"/>
           </a:p>
@@ -3618,7 +3559,7 @@
           <a:p>
             <a:fld id="{7814C785-670F-4FD8-BE2A-83BE1140FC41}" type="datetimeFigureOut">
               <a:rPr lang="en-US" smtClean="0"/>
-              <a:t>1/31/2018</a:t>
+              <a:t>2/15/2018</a:t>
             </a:fld>
             <a:endParaRPr lang="en-US"/>
           </a:p>
@@ -3735,7 +3676,7 @@
           <a:p>
             <a:fld id="{7814C785-670F-4FD8-BE2A-83BE1140FC41}" type="datetimeFigureOut">
               <a:rPr lang="en-US" smtClean="0"/>
-              <a:t>1/31/2018</a:t>
+              <a:t>2/15/2018</a:t>
             </a:fld>
             <a:endParaRPr lang="en-US"/>
           </a:p>
@@ -3830,7 +3771,7 @@
           <a:p>
             <a:fld id="{7814C785-670F-4FD8-BE2A-83BE1140FC41}" type="datetimeFigureOut">
               <a:rPr lang="en-US" smtClean="0"/>
-              <a:t>1/31/2018</a:t>
+              <a:t>2/15/2018</a:t>
             </a:fld>
             <a:endParaRPr lang="en-US"/>
           </a:p>
@@ -4105,7 +4046,7 @@
           <a:p>
             <a:fld id="{7814C785-670F-4FD8-BE2A-83BE1140FC41}" type="datetimeFigureOut">
               <a:rPr lang="en-US" smtClean="0"/>
-              <a:t>1/31/2018</a:t>
+              <a:t>2/15/2018</a:t>
             </a:fld>
             <a:endParaRPr lang="en-US"/>
           </a:p>
@@ -4357,7 +4298,7 @@
           <a:p>
             <a:fld id="{7814C785-670F-4FD8-BE2A-83BE1140FC41}" type="datetimeFigureOut">
               <a:rPr lang="en-US" smtClean="0"/>
-              <a:t>1/31/2018</a:t>
+              <a:t>2/15/2018</a:t>
             </a:fld>
             <a:endParaRPr lang="en-US"/>
           </a:p>
@@ -4568,7 +4509,7 @@
           <a:p>
             <a:fld id="{7814C785-670F-4FD8-BE2A-83BE1140FC41}" type="datetimeFigureOut">
               <a:rPr lang="en-US" smtClean="0"/>
-              <a:t>1/31/2018</a:t>
+              <a:t>2/15/2018</a:t>
             </a:fld>
             <a:endParaRPr lang="en-US"/>
           </a:p>
@@ -5324,14 +5265,14 @@
           <p:nvPr>
             <p:extLst>
               <p:ext uri="{D42A27DB-BD31-4B8C-83A1-F6EECF244321}">
-                <p14:modId xmlns:p14="http://schemas.microsoft.com/office/powerpoint/2010/main" val="675556780"/>
+                <p14:modId xmlns:p14="http://schemas.microsoft.com/office/powerpoint/2010/main" val="2151710967"/>
               </p:ext>
             </p:extLst>
           </p:nvPr>
         </p:nvGraphicFramePr>
         <p:xfrm>
-          <a:off x="3463148" y="1281648"/>
-          <a:ext cx="4739097" cy="2552333"/>
+          <a:off x="1843407" y="1764056"/>
+          <a:ext cx="6034501" cy="2126147"/>
         </p:xfrm>
         <a:graphic>
           <a:graphicData uri="http://schemas.openxmlformats.org/drawingml/2006/chart">
@@ -5413,8 +5354,8 @@
         </p:nvSpPr>
         <p:spPr>
           <a:xfrm>
-            <a:off x="2629032" y="1618772"/>
-            <a:ext cx="678944" cy="276220"/>
+            <a:off x="2756178" y="1382532"/>
+            <a:ext cx="659291" cy="236405"/>
           </a:xfrm>
           <a:prstGeom prst="rect">
             <a:avLst/>
@@ -5466,8 +5407,8 @@
         </p:nvSpPr>
         <p:spPr>
           <a:xfrm>
-            <a:off x="1523510" y="1667851"/>
-            <a:ext cx="1252536" cy="258935"/>
+            <a:off x="1650656" y="1431612"/>
+            <a:ext cx="1216280" cy="221612"/>
           </a:xfrm>
           <a:prstGeom prst="rect">
             <a:avLst/>
@@ -5517,7 +5458,7 @@
         </p:nvSpPr>
         <p:spPr>
           <a:xfrm>
-            <a:off x="8051988" y="1619806"/>
+            <a:off x="8098021" y="1869069"/>
             <a:ext cx="1417146" cy="306980"/>
           </a:xfrm>
           <a:prstGeom prst="rect">
@@ -5568,7 +5509,7 @@
         </p:nvSpPr>
         <p:spPr>
           <a:xfrm>
-            <a:off x="9529482" y="1675606"/>
+            <a:off x="9515167" y="1917195"/>
             <a:ext cx="744796" cy="175247"/>
           </a:xfrm>
           <a:prstGeom prst="rect">
@@ -5621,7 +5562,7 @@
         </p:nvSpPr>
         <p:spPr>
           <a:xfrm>
-            <a:off x="8602217" y="2071623"/>
+            <a:off x="9582698" y="2437720"/>
             <a:ext cx="698364" cy="229186"/>
           </a:xfrm>
           <a:prstGeom prst="rect">
@@ -5672,7 +5613,7 @@
         </p:nvSpPr>
         <p:spPr>
           <a:xfrm>
-            <a:off x="8619673" y="2453437"/>
+            <a:off x="9561599" y="2790897"/>
             <a:ext cx="698364" cy="229186"/>
           </a:xfrm>
           <a:prstGeom prst="rect">
@@ -5723,7 +5664,7 @@
         </p:nvSpPr>
         <p:spPr>
           <a:xfrm>
-            <a:off x="8619673" y="2773351"/>
+            <a:off x="9575715" y="3144074"/>
             <a:ext cx="698364" cy="229186"/>
           </a:xfrm>
           <a:prstGeom prst="rect">
@@ -5766,112 +5707,6 @@
           </a:p>
         </p:txBody>
       </p:sp>
-      <p:cxnSp>
-        <p:nvCxnSpPr>
-          <p:cNvPr id="33" name="Straight Connector 32"/>
-          <p:cNvCxnSpPr/>
-          <p:nvPr/>
-        </p:nvCxnSpPr>
-        <p:spPr>
-          <a:xfrm>
-            <a:off x="9321778" y="2186216"/>
-            <a:ext cx="952500" cy="0"/>
-          </a:xfrm>
-          <a:prstGeom prst="line">
-            <a:avLst/>
-          </a:prstGeom>
-          <a:ln w="25400"/>
-        </p:spPr>
-        <p:style>
-          <a:lnRef idx="1">
-            <a:schemeClr val="accent1"/>
-          </a:lnRef>
-          <a:fillRef idx="0">
-            <a:schemeClr val="accent1"/>
-          </a:fillRef>
-          <a:effectRef idx="0">
-            <a:schemeClr val="accent1"/>
-          </a:effectRef>
-          <a:fontRef idx="minor">
-            <a:schemeClr val="tx1"/>
-          </a:fontRef>
-        </p:style>
-      </p:cxnSp>
-      <p:cxnSp>
-        <p:nvCxnSpPr>
-          <p:cNvPr id="34" name="Straight Connector 33"/>
-          <p:cNvCxnSpPr/>
-          <p:nvPr/>
-        </p:nvCxnSpPr>
-        <p:spPr>
-          <a:xfrm>
-            <a:off x="9321778" y="2548875"/>
-            <a:ext cx="952500" cy="0"/>
-          </a:xfrm>
-          <a:prstGeom prst="line">
-            <a:avLst/>
-          </a:prstGeom>
-          <a:ln w="25400">
-            <a:solidFill>
-              <a:schemeClr val="accent2">
-                <a:lumMod val="60000"/>
-                <a:lumOff val="40000"/>
-              </a:schemeClr>
-            </a:solidFill>
-          </a:ln>
-        </p:spPr>
-        <p:style>
-          <a:lnRef idx="1">
-            <a:schemeClr val="accent1"/>
-          </a:lnRef>
-          <a:fillRef idx="0">
-            <a:schemeClr val="accent1"/>
-          </a:fillRef>
-          <a:effectRef idx="0">
-            <a:schemeClr val="accent1"/>
-          </a:effectRef>
-          <a:fontRef idx="minor">
-            <a:schemeClr val="tx1"/>
-          </a:fontRef>
-        </p:style>
-      </p:cxnSp>
-      <p:cxnSp>
-        <p:nvCxnSpPr>
-          <p:cNvPr id="35" name="Straight Connector 34"/>
-          <p:cNvCxnSpPr/>
-          <p:nvPr/>
-        </p:nvCxnSpPr>
-        <p:spPr>
-          <a:xfrm>
-            <a:off x="9321778" y="2887944"/>
-            <a:ext cx="952500" cy="0"/>
-          </a:xfrm>
-          <a:prstGeom prst="line">
-            <a:avLst/>
-          </a:prstGeom>
-          <a:ln w="25400">
-            <a:solidFill>
-              <a:schemeClr val="bg2">
-                <a:lumMod val="75000"/>
-              </a:schemeClr>
-            </a:solidFill>
-          </a:ln>
-        </p:spPr>
-        <p:style>
-          <a:lnRef idx="1">
-            <a:schemeClr val="accent1"/>
-          </a:lnRef>
-          <a:fillRef idx="0">
-            <a:schemeClr val="accent1"/>
-          </a:fillRef>
-          <a:effectRef idx="0">
-            <a:schemeClr val="accent1"/>
-          </a:effectRef>
-          <a:fontRef idx="minor">
-            <a:schemeClr val="tx1"/>
-          </a:fontRef>
-        </p:style>
-      </p:cxnSp>
       <p:sp>
         <p:nvSpPr>
           <p:cNvPr id="42" name="TextBox 41"/>
@@ -5880,7 +5715,7 @@
         </p:nvSpPr>
         <p:spPr>
           <a:xfrm>
-            <a:off x="1615854" y="2199562"/>
+            <a:off x="3821526" y="1425725"/>
             <a:ext cx="830705" cy="276597"/>
           </a:xfrm>
           <a:prstGeom prst="rect">
@@ -5909,7 +5744,7 @@
         </p:nvSpPr>
         <p:spPr>
           <a:xfrm>
-            <a:off x="1605775" y="2682623"/>
+            <a:off x="5878503" y="1424596"/>
             <a:ext cx="812034" cy="276999"/>
           </a:xfrm>
           <a:prstGeom prst="rect">
@@ -5938,7 +5773,7 @@
         </p:nvSpPr>
         <p:spPr>
           <a:xfrm>
-            <a:off x="2408417" y="2128087"/>
+            <a:off x="4614089" y="1354250"/>
             <a:ext cx="898182" cy="276999"/>
           </a:xfrm>
           <a:prstGeom prst="rect">
@@ -5972,7 +5807,7 @@
         </p:nvSpPr>
         <p:spPr>
           <a:xfrm>
-            <a:off x="2398566" y="2613004"/>
+            <a:off x="6671294" y="1354977"/>
             <a:ext cx="898182" cy="276999"/>
           </a:xfrm>
           <a:prstGeom prst="rect">
@@ -6007,14 +5842,14 @@
           <p:nvPr>
             <p:extLst>
               <p:ext uri="{D42A27DB-BD31-4B8C-83A1-F6EECF244321}">
-                <p14:modId xmlns:p14="http://schemas.microsoft.com/office/powerpoint/2010/main" val="187188071"/>
+                <p14:modId xmlns:p14="http://schemas.microsoft.com/office/powerpoint/2010/main" val="2256032848"/>
               </p:ext>
             </p:extLst>
           </p:nvPr>
         </p:nvGraphicFramePr>
         <p:xfrm>
-          <a:off x="2885234" y="3993324"/>
-          <a:ext cx="6221508" cy="1463040"/>
+          <a:off x="1809865" y="4394684"/>
+          <a:ext cx="7158990" cy="1592207"/>
         </p:xfrm>
         <a:graphic>
           <a:graphicData uri="http://schemas.openxmlformats.org/drawingml/2006/table">
@@ -6023,42 +5858,42 @@
                 <a:tableStyleId>{2D5ABB26-0587-4C30-8999-92F81FD0307C}</a:tableStyleId>
               </a:tblPr>
               <a:tblGrid>
-                <a:gridCol w="1036918">
+                <a:gridCol w="1193165">
                   <a:extLst>
                     <a:ext uri="{9D8B030D-6E8A-4147-A177-3AD203B41FA5}">
                       <a16:colId xmlns:a16="http://schemas.microsoft.com/office/drawing/2014/main" val="291818833"/>
                     </a:ext>
                   </a:extLst>
                 </a:gridCol>
-                <a:gridCol w="1036918">
+                <a:gridCol w="1193165">
                   <a:extLst>
                     <a:ext uri="{9D8B030D-6E8A-4147-A177-3AD203B41FA5}">
                       <a16:colId xmlns:a16="http://schemas.microsoft.com/office/drawing/2014/main" val="1227044142"/>
                     </a:ext>
                   </a:extLst>
                 </a:gridCol>
-                <a:gridCol w="1036918">
+                <a:gridCol w="1193165">
                   <a:extLst>
                     <a:ext uri="{9D8B030D-6E8A-4147-A177-3AD203B41FA5}">
                       <a16:colId xmlns:a16="http://schemas.microsoft.com/office/drawing/2014/main" val="1076719010"/>
                     </a:ext>
                   </a:extLst>
                 </a:gridCol>
-                <a:gridCol w="1036918">
+                <a:gridCol w="1193165">
                   <a:extLst>
                     <a:ext uri="{9D8B030D-6E8A-4147-A177-3AD203B41FA5}">
                       <a16:colId xmlns:a16="http://schemas.microsoft.com/office/drawing/2014/main" val="2467131364"/>
                     </a:ext>
                   </a:extLst>
                 </a:gridCol>
-                <a:gridCol w="1036918">
+                <a:gridCol w="1193165">
                   <a:extLst>
                     <a:ext uri="{9D8B030D-6E8A-4147-A177-3AD203B41FA5}">
                       <a16:colId xmlns:a16="http://schemas.microsoft.com/office/drawing/2014/main" val="2254078971"/>
                     </a:ext>
                   </a:extLst>
                 </a:gridCol>
-                <a:gridCol w="1036918">
+                <a:gridCol w="1193165">
                   <a:extLst>
                     <a:ext uri="{9D8B030D-6E8A-4147-A177-3AD203B41FA5}">
                       <a16:colId xmlns:a16="http://schemas.microsoft.com/office/drawing/2014/main" val="2199188648"/>
@@ -6066,7 +5901,7 @@
                   </a:extLst>
                 </a:gridCol>
               </a:tblGrid>
-              <a:tr h="464199">
+              <a:tr h="696590">
                 <a:tc>
                   <a:txBody>
                     <a:bodyPr/>
@@ -6442,7 +6277,7 @@
                   </a:ext>
                 </a:extLst>
               </a:tr>
-              <a:tr h="240576">
+              <a:tr h="298539">
                 <a:tc>
                   <a:txBody>
                     <a:bodyPr/>
@@ -6794,7 +6629,7 @@
                   </a:ext>
                 </a:extLst>
               </a:tr>
-              <a:tr h="240576">
+              <a:tr h="298539">
                 <a:tc>
                   <a:txBody>
                     <a:bodyPr/>
@@ -7172,7 +7007,7 @@
                   </a:ext>
                 </a:extLst>
               </a:tr>
-              <a:tr h="240576">
+              <a:tr h="298539">
                 <a:tc>
                   <a:txBody>
                     <a:bodyPr/>
@@ -7552,6 +7387,165 @@
           </a:graphicData>
         </a:graphic>
       </p:graphicFrame>
+      <p:sp>
+        <p:nvSpPr>
+          <p:cNvPr id="2" name="Rounded Rectangle 1"/>
+          <p:cNvSpPr/>
+          <p:nvPr/>
+        </p:nvSpPr>
+        <p:spPr>
+          <a:xfrm>
+            <a:off x="8975838" y="2443843"/>
+            <a:ext cx="606860" cy="229186"/>
+          </a:xfrm>
+          <a:prstGeom prst="roundRect">
+            <a:avLst/>
+          </a:prstGeom>
+          <a:noFill/>
+          <a:ln>
+            <a:solidFill>
+              <a:schemeClr val="tx1"/>
+            </a:solidFill>
+          </a:ln>
+        </p:spPr>
+        <p:style>
+          <a:lnRef idx="2">
+            <a:schemeClr val="accent1">
+              <a:shade val="50000"/>
+            </a:schemeClr>
+          </a:lnRef>
+          <a:fillRef idx="1">
+            <a:schemeClr val="accent1"/>
+          </a:fillRef>
+          <a:effectRef idx="0">
+            <a:schemeClr val="accent1"/>
+          </a:effectRef>
+          <a:fontRef idx="minor">
+            <a:schemeClr val="lt1"/>
+          </a:fontRef>
+        </p:style>
+        <p:txBody>
+          <a:bodyPr rtlCol="0" anchor="ctr"/>
+          <a:lstStyle/>
+          <a:p>
+            <a:pPr algn="ctr"/>
+            <a:r>
+              <a:rPr lang="en-US" sz="1100" dirty="0">
+                <a:solidFill>
+                  <a:schemeClr val="tx1"/>
+                </a:solidFill>
+              </a:rPr>
+              <a:t>delete</a:t>
+            </a:r>
+          </a:p>
+        </p:txBody>
+      </p:sp>
+      <p:sp>
+        <p:nvSpPr>
+          <p:cNvPr id="32" name="Rounded Rectangle 31"/>
+          <p:cNvSpPr/>
+          <p:nvPr/>
+        </p:nvSpPr>
+        <p:spPr>
+          <a:xfrm>
+            <a:off x="8975838" y="2775737"/>
+            <a:ext cx="606860" cy="229186"/>
+          </a:xfrm>
+          <a:prstGeom prst="roundRect">
+            <a:avLst/>
+          </a:prstGeom>
+          <a:noFill/>
+          <a:ln>
+            <a:solidFill>
+              <a:schemeClr val="tx1"/>
+            </a:solidFill>
+          </a:ln>
+        </p:spPr>
+        <p:style>
+          <a:lnRef idx="2">
+            <a:schemeClr val="accent1">
+              <a:shade val="50000"/>
+            </a:schemeClr>
+          </a:lnRef>
+          <a:fillRef idx="1">
+            <a:schemeClr val="accent1"/>
+          </a:fillRef>
+          <a:effectRef idx="0">
+            <a:schemeClr val="accent1"/>
+          </a:effectRef>
+          <a:fontRef idx="minor">
+            <a:schemeClr val="lt1"/>
+          </a:fontRef>
+        </p:style>
+        <p:txBody>
+          <a:bodyPr rtlCol="0" anchor="ctr"/>
+          <a:lstStyle/>
+          <a:p>
+            <a:pPr algn="ctr"/>
+            <a:r>
+              <a:rPr lang="en-US" sz="1100" dirty="0">
+                <a:solidFill>
+                  <a:schemeClr val="tx1"/>
+                </a:solidFill>
+              </a:rPr>
+              <a:t>delete</a:t>
+            </a:r>
+          </a:p>
+        </p:txBody>
+      </p:sp>
+      <p:sp>
+        <p:nvSpPr>
+          <p:cNvPr id="36" name="Rounded Rectangle 35"/>
+          <p:cNvSpPr/>
+          <p:nvPr/>
+        </p:nvSpPr>
+        <p:spPr>
+          <a:xfrm>
+            <a:off x="8975838" y="3096908"/>
+            <a:ext cx="606860" cy="229186"/>
+          </a:xfrm>
+          <a:prstGeom prst="roundRect">
+            <a:avLst/>
+          </a:prstGeom>
+          <a:noFill/>
+          <a:ln>
+            <a:solidFill>
+              <a:schemeClr val="tx1"/>
+            </a:solidFill>
+          </a:ln>
+        </p:spPr>
+        <p:style>
+          <a:lnRef idx="2">
+            <a:schemeClr val="accent1">
+              <a:shade val="50000"/>
+            </a:schemeClr>
+          </a:lnRef>
+          <a:fillRef idx="1">
+            <a:schemeClr val="accent1"/>
+          </a:fillRef>
+          <a:effectRef idx="0">
+            <a:schemeClr val="accent1"/>
+          </a:effectRef>
+          <a:fontRef idx="minor">
+            <a:schemeClr val="lt1"/>
+          </a:fontRef>
+        </p:style>
+        <p:txBody>
+          <a:bodyPr rtlCol="0" anchor="ctr"/>
+          <a:lstStyle/>
+          <a:p>
+            <a:pPr algn="ctr"/>
+            <a:r>
+              <a:rPr lang="en-US" sz="1100" dirty="0">
+                <a:solidFill>
+                  <a:schemeClr val="tx1"/>
+                </a:solidFill>
+              </a:rPr>
+              <a:t>delete</a:t>
+            </a:r>
+          </a:p>
+        </p:txBody>
+      </p:sp>
     </p:spTree>
     <p:extLst>
       <p:ext uri="{BB962C8B-B14F-4D97-AF65-F5344CB8AC3E}">

</xml_diff>